<commit_message>
Change WBS for afw in system design diagram.
</commit_message>
<xml_diff>
--- a/DMS-Architecture.pptx
+++ b/DMS-Architecture.pptx
@@ -107,6 +107,22 @@
       </a:defRPr>
     </a:lvl9pPr>
   </p:defaultTextStyle>
+  <p:extLst>
+    <p:ext uri="{EFAFB233-063F-42B5-8137-9DF3F51BA10A}">
+      <p15:sldGuideLst xmlns:p15="http://schemas.microsoft.com/office/powerpoint/2012/main">
+        <p15:guide id="1" orient="horz" pos="2160">
+          <p15:clr>
+            <a:srgbClr val="A4A3A4"/>
+          </p15:clr>
+        </p15:guide>
+        <p15:guide id="2" pos="2880">
+          <p15:clr>
+            <a:srgbClr val="A4A3A4"/>
+          </p15:clr>
+        </p15:guide>
+      </p15:sldGuideLst>
+    </p:ext>
+  </p:extLst>
 </p:presentation>
 </file>
 
@@ -192,7 +208,7 @@
           <a:p>
             <a:fld id="{DBAC7EBA-AB40-9047-8B6A-F6C983C75F64}" type="datetimeFigureOut">
               <a:rPr lang="en-US" smtClean="0"/>
-              <a:t>10/6/13</a:t>
+              <a:t>10/23/15</a:t>
             </a:fld>
             <a:endParaRPr lang="en-US"/>
           </a:p>
@@ -598,6 +614,11 @@
         </p:txBody>
       </p:sp>
     </p:spTree>
+    <p:extLst>
+      <p:ext uri="{BB962C8B-B14F-4D97-AF65-F5344CB8AC3E}">
+        <p14:creationId xmlns:p14="http://schemas.microsoft.com/office/powerpoint/2010/main" val="2041110429"/>
+      </p:ext>
+    </p:extLst>
   </p:cSld>
   <p:clrMapOvr>
     <a:masterClrMapping/>
@@ -686,50 +707,8 @@
                 </a:solidFill>
                 <a:latin typeface="Calibri" charset="0"/>
               </a:rPr>
-              <a:t>Name of Meeting </a:t>
-            </a:r>
-            <a:r>
-              <a:rPr lang="en-US" sz="1000" dirty="0">
-                <a:solidFill>
-                  <a:prstClr val="white"/>
-                </a:solidFill>
-                <a:latin typeface="Calibri" charset="0"/>
-              </a:rPr>
-              <a:t>•</a:t>
-            </a:r>
-            <a:r>
-              <a:rPr lang="en-US" sz="1000" dirty="0">
-                <a:solidFill>
-                  <a:prstClr val="white"/>
-                </a:solidFill>
-                <a:latin typeface="Calibri" charset="0"/>
-              </a:rPr>
-              <a:t> Location </a:t>
-            </a:r>
-            <a:r>
-              <a:rPr lang="en-US" sz="1000" dirty="0">
-                <a:solidFill>
-                  <a:prstClr val="white"/>
-                </a:solidFill>
-                <a:latin typeface="Calibri" charset="0"/>
-              </a:rPr>
-              <a:t>•</a:t>
-            </a:r>
-            <a:r>
-              <a:rPr lang="en-US" sz="1000" dirty="0">
-                <a:solidFill>
-                  <a:prstClr val="white"/>
-                </a:solidFill>
-                <a:latin typeface="Calibri" charset="0"/>
-              </a:rPr>
-              <a:t> Date  -  Change in Slide Master</a:t>
-            </a:r>
-            <a:endParaRPr lang="en-US" sz="1000" dirty="0">
-              <a:solidFill>
-                <a:prstClr val="white"/>
-              </a:solidFill>
-              <a:latin typeface="Calibri" charset="0"/>
-            </a:endParaRPr>
+              <a:t>Name of Meeting • Location • Date  -  Change in Slide Master</a:t>
+            </a:r>
           </a:p>
         </p:txBody>
       </p:sp>
@@ -917,13 +896,6 @@
               </a:rPr>
               <a:t>Final Design Review | Tucson, AZ | October 21-25, 2013</a:t>
             </a:r>
-            <a:endParaRPr lang="en-US" sz="1200" cap="all" dirty="0">
-              <a:solidFill>
-                <a:prstClr val="white"/>
-              </a:solidFill>
-              <a:latin typeface="Arial Narrow"/>
-              <a:cs typeface="Arial Narrow"/>
-            </a:endParaRPr>
           </a:p>
         </p:txBody>
       </p:sp>
@@ -1802,7 +1774,7 @@
   <p:clrMapOvr>
     <a:masterClrMapping/>
   </p:clrMapOvr>
-  <p:transition xmlns:p14="http://schemas.microsoft.com/office/powerpoint/2010/main"/>
+  <p:transition/>
 </p:sldLayout>
 </file>
 
@@ -2410,13 +2382,6 @@
               </a:rPr>
               <a:t> | September 19-20, 2013</a:t>
             </a:r>
-            <a:endParaRPr lang="en-US" sz="1200" cap="all" dirty="0">
-              <a:solidFill>
-                <a:prstClr val="white"/>
-              </a:solidFill>
-              <a:latin typeface="Arial Narrow"/>
-              <a:cs typeface="Arial Narrow"/>
-            </a:endParaRPr>
           </a:p>
         </p:txBody>
       </p:sp>
@@ -2731,13 +2696,6 @@
               </a:rPr>
               <a:t>Final Design Review | Tucson, AZ | October 21-25, 2013</a:t>
             </a:r>
-            <a:endParaRPr lang="en-US" sz="1200" cap="all" dirty="0">
-              <a:solidFill>
-                <a:prstClr val="white"/>
-              </a:solidFill>
-              <a:latin typeface="Arial Narrow"/>
-              <a:cs typeface="Arial Narrow"/>
-            </a:endParaRPr>
           </a:p>
         </p:txBody>
       </p:sp>
@@ -2767,7 +2725,7 @@
   <p:timing>
     <p:tnLst>
       <p:par>
-        <p:cTn xmlns:p14="http://schemas.microsoft.com/office/powerpoint/2010/main" id="1" dur="indefinite" restart="never" nodeType="tmRoot"/>
+        <p:cTn id="1" dur="indefinite" restart="never" nodeType="tmRoot"/>
       </p:par>
     </p:tnLst>
   </p:timing>
@@ -3246,16 +3204,7 @@
                 </a:solidFill>
                 <a:latin typeface="Calibri"/>
               </a:rPr>
-              <a:t>Data </a:t>
-            </a:r>
-            <a:r>
-              <a:rPr lang="en-US" sz="1200" b="1" dirty="0">
-                <a:solidFill>
-                  <a:prstClr val="black"/>
-                </a:solidFill>
-                <a:latin typeface="Calibri"/>
-              </a:rPr>
-              <a:t>Access Services</a:t>
+              <a:t>Data Access Services</a:t>
             </a:r>
             <a:endParaRPr lang="en-US" sz="1600" dirty="0">
               <a:solidFill>
@@ -3318,16 +3267,7 @@
                 </a:solidFill>
                 <a:latin typeface="Calibri"/>
               </a:rPr>
-              <a:t>Processing </a:t>
-            </a:r>
-            <a:r>
-              <a:rPr lang="en-US" sz="1200" b="1" dirty="0">
-                <a:solidFill>
-                  <a:prstClr val="black"/>
-                </a:solidFill>
-                <a:latin typeface="Calibri"/>
-              </a:rPr>
-              <a:t>Middleware</a:t>
+              <a:t>Processing Middleware</a:t>
             </a:r>
             <a:endParaRPr lang="en-US" sz="1600" dirty="0">
               <a:solidFill>
@@ -3402,25 +3342,7 @@
                 </a:solidFill>
                 <a:latin typeface="Calibri"/>
               </a:rPr>
-              <a:t>(System </a:t>
-            </a:r>
-            <a:r>
-              <a:rPr lang="en-US" sz="1200" b="1" dirty="0">
-                <a:solidFill>
-                  <a:prstClr val="black"/>
-                </a:solidFill>
-                <a:latin typeface="Calibri"/>
-              </a:rPr>
-              <a:t>Administration, Operations, </a:t>
-            </a:r>
-            <a:r>
-              <a:rPr lang="en-US" sz="1200" b="1" dirty="0">
-                <a:solidFill>
-                  <a:prstClr val="black"/>
-                </a:solidFill>
-                <a:latin typeface="Calibri"/>
-              </a:rPr>
-              <a:t>Security)</a:t>
+              <a:t>(System Administration, Operations, Security)</a:t>
             </a:r>
             <a:endParaRPr lang="en-US" sz="1600" dirty="0">
               <a:solidFill>
@@ -3483,16 +3405,7 @@
                 </a:solidFill>
                 <a:latin typeface="Calibri"/>
               </a:rPr>
-              <a:t>Long</a:t>
-            </a:r>
-            <a:r>
-              <a:rPr lang="en-US" sz="1200" b="1" dirty="0">
-                <a:solidFill>
-                  <a:prstClr val="black"/>
-                </a:solidFill>
-                <a:latin typeface="Calibri"/>
-              </a:rPr>
-              <a:t>-Haul</a:t>
+              <a:t>Long-Haul</a:t>
             </a:r>
           </a:p>
           <a:p>
@@ -3618,16 +3531,7 @@
                 </a:solidFill>
                 <a:latin typeface="Calibri"/>
               </a:rPr>
-              <a:t>Base </a:t>
-            </a:r>
-            <a:r>
-              <a:rPr lang="en-US" sz="1200" b="1" dirty="0">
-                <a:solidFill>
-                  <a:prstClr val="black"/>
-                </a:solidFill>
-                <a:latin typeface="Calibri"/>
-              </a:rPr>
-              <a:t>Site</a:t>
+              <a:t>Base Site</a:t>
             </a:r>
             <a:endParaRPr lang="en-US" sz="1600" dirty="0">
               <a:solidFill>
@@ -3890,25 +3794,7 @@
                 </a:solidFill>
                 <a:latin typeface="Calibri"/>
               </a:rPr>
-              <a:t>Custom Software on top of Open Source</a:t>
-            </a:r>
-            <a:r>
-              <a:rPr lang="en-US" sz="1600" dirty="0">
-                <a:solidFill>
-                  <a:prstClr val="black"/>
-                </a:solidFill>
-                <a:latin typeface="Calibri"/>
-              </a:rPr>
-              <a:t>, Off</a:t>
-            </a:r>
-            <a:r>
-              <a:rPr lang="en-US" sz="1600" dirty="0">
-                <a:solidFill>
-                  <a:prstClr val="black"/>
-                </a:solidFill>
-                <a:latin typeface="Calibri"/>
-              </a:rPr>
-              <a:t>-the-shelf Software</a:t>
+              <a:t>Custom Software on top of Open Source, Off-the-shelf Software</a:t>
             </a:r>
           </a:p>
         </p:txBody>
@@ -4156,16 +4042,7 @@
                     </a:solidFill>
                     <a:latin typeface="Calibri"/>
                   </a:rPr>
-                  <a:t>Science </a:t>
-                </a:r>
-                <a:r>
-                  <a:rPr lang="en-US" sz="1200" b="1" dirty="0">
-                    <a:solidFill>
-                      <a:prstClr val="black"/>
-                    </a:solidFill>
-                    <a:latin typeface="Calibri"/>
-                  </a:rPr>
-                  <a:t>Data Archive</a:t>
+                  <a:t>Science Data Archive</a:t>
                 </a:r>
               </a:p>
               <a:p>
@@ -4250,43 +4127,7 @@
                     </a:solidFill>
                     <a:latin typeface="Calibri"/>
                   </a:rPr>
-                  <a:t>Alert</a:t>
-                </a:r>
-                <a:r>
-                  <a:rPr lang="en-US" sz="1100" b="1" dirty="0">
-                    <a:solidFill>
-                      <a:prstClr val="black"/>
-                    </a:solidFill>
-                    <a:latin typeface="Calibri"/>
-                  </a:rPr>
-                  <a:t>,</a:t>
-                </a:r>
-                <a:r>
-                  <a:rPr lang="en-US" sz="1100" b="1" dirty="0">
-                    <a:solidFill>
-                      <a:prstClr val="black"/>
-                    </a:solidFill>
-                    <a:latin typeface="Calibri"/>
-                  </a:rPr>
-                  <a:t> SDQA, Calibration</a:t>
-                </a:r>
-                <a:r>
-                  <a:rPr lang="en-US" sz="1100" b="1" dirty="0">
-                    <a:solidFill>
-                      <a:prstClr val="black"/>
-                    </a:solidFill>
-                    <a:latin typeface="Calibri"/>
-                  </a:rPr>
-                  <a:t>,</a:t>
-                </a:r>
-                <a:r>
-                  <a:rPr lang="en-US" sz="1100" b="1" dirty="0">
-                    <a:solidFill>
-                      <a:prstClr val="black"/>
-                    </a:solidFill>
-                    <a:latin typeface="Calibri"/>
-                  </a:rPr>
-                  <a:t> </a:t>
+                  <a:t>Alert, SDQA, Calibration, </a:t>
                 </a:r>
               </a:p>
               <a:p>
@@ -4359,8 +4200,23 @@
                     </a:solidFill>
                     <a:latin typeface="Calibri"/>
                   </a:rPr>
-                  <a:t> 02C.03.05, 02C.04.07</a:t>
+                  <a:t> 02C.03.05, </a:t>
                 </a:r>
+                <a:r>
+                  <a:rPr lang="en-US" sz="1200" b="1" dirty="0" smtClean="0">
+                    <a:solidFill>
+                      <a:prstClr val="black"/>
+                    </a:solidFill>
+                    <a:latin typeface="Calibri"/>
+                  </a:rPr>
+                  <a:t>02C.04.01</a:t>
+                </a:r>
+                <a:endParaRPr lang="en-US" sz="1200" b="1" dirty="0">
+                  <a:solidFill>
+                    <a:prstClr val="black"/>
+                  </a:solidFill>
+                  <a:latin typeface="Calibri"/>
+                </a:endParaRPr>
               </a:p>
               <a:p>
                 <a:pPr algn="ctr"/>
@@ -4371,16 +4227,7 @@
                     </a:solidFill>
                     <a:latin typeface="Calibri"/>
                   </a:rPr>
-                  <a:t>Application </a:t>
-                </a:r>
-                <a:r>
-                  <a:rPr lang="en-US" sz="1200" b="1" dirty="0">
-                    <a:solidFill>
-                      <a:prstClr val="black"/>
-                    </a:solidFill>
-                    <a:latin typeface="Calibri"/>
-                  </a:rPr>
-                  <a:t>Framework</a:t>
+                  <a:t>Application Framework</a:t>
                 </a:r>
                 <a:endParaRPr lang="en-US" sz="1600" dirty="0">
                   <a:solidFill>
@@ -4442,25 +4289,7 @@
                   </a:solidFill>
                   <a:latin typeface="Calibri"/>
                 </a:rPr>
-                <a:t>Science </a:t>
-              </a:r>
-              <a:r>
-                <a:rPr lang="en-US" sz="1200" b="1" dirty="0">
-                  <a:solidFill>
-                    <a:prstClr val="black"/>
-                  </a:solidFill>
-                  <a:latin typeface="Calibri"/>
-                </a:rPr>
-                <a:t>User Interface</a:t>
-              </a:r>
-              <a:r>
-                <a:rPr lang="en-US" sz="1200" b="1" dirty="0">
-                  <a:solidFill>
-                    <a:prstClr val="black"/>
-                  </a:solidFill>
-                  <a:latin typeface="Calibri"/>
-                </a:rPr>
-                <a:t> </a:t>
+                <a:t>Science User Interface </a:t>
               </a:r>
             </a:p>
             <a:p>
@@ -4472,16 +4301,7 @@
                   </a:solidFill>
                   <a:latin typeface="Calibri"/>
                 </a:rPr>
-                <a:t>and </a:t>
-              </a:r>
-              <a:r>
-                <a:rPr lang="en-US" sz="1200" b="1" dirty="0">
-                  <a:solidFill>
-                    <a:prstClr val="black"/>
-                  </a:solidFill>
-                  <a:latin typeface="Calibri"/>
-                </a:rPr>
-                <a:t>Analysis Tools</a:t>
+                <a:t>and Analysis Tools</a:t>
               </a:r>
               <a:endParaRPr lang="en-US" sz="1600" dirty="0">
                 <a:solidFill>
@@ -4545,16 +4365,7 @@
                 </a:solidFill>
                 <a:latin typeface="Calibri"/>
               </a:rPr>
-              <a:t>Archive </a:t>
-            </a:r>
-            <a:r>
-              <a:rPr lang="en-US" sz="1200" b="1" dirty="0">
-                <a:solidFill>
-                  <a:prstClr val="black"/>
-                </a:solidFill>
-                <a:latin typeface="Calibri"/>
-              </a:rPr>
-              <a:t>Site</a:t>
+              <a:t>Archive Site</a:t>
             </a:r>
             <a:endParaRPr lang="en-US" sz="1600" dirty="0">
               <a:solidFill>
@@ -4717,7 +4528,7 @@
   <p:timing>
     <p:tnLst>
       <p:par>
-        <p:cTn xmlns:p14="http://schemas.microsoft.com/office/powerpoint/2010/main" id="1" dur="indefinite" restart="never" nodeType="tmRoot"/>
+        <p:cTn id="1" dur="indefinite" restart="never" nodeType="tmRoot"/>
       </p:par>
     </p:tnLst>
   </p:timing>

</xml_diff>